<commit_message>
Added conveyor belt class diagram
</commit_message>
<xml_diff>
--- a/Presentation/Presentation_slides.pptx
+++ b/Presentation/Presentation_slides.pptx
@@ -61385,6 +61385,304 @@
           </a:prstGeom>
         </p:spPr>
       </p:pic>
+      <p:sp>
+        <p:nvSpPr>
+          <p:cNvPr id="9" name="Rectangle 8">
+            <a:extLst>
+              <a:ext uri="{FF2B5EF4-FFF2-40B4-BE49-F238E27FC236}">
+                <a16:creationId xmlns:a16="http://schemas.microsoft.com/office/drawing/2014/main" id="{C6FBA5A3-5E62-4861-A8C5-0A461A25490A}"/>
+              </a:ext>
+            </a:extLst>
+          </p:cNvPr>
+          <p:cNvSpPr/>
+          <p:nvPr/>
+        </p:nvSpPr>
+        <p:spPr>
+          <a:xfrm>
+            <a:off x="6466114" y="3882861"/>
+            <a:ext cx="2132580" cy="2256682"/>
+          </a:xfrm>
+          <a:prstGeom prst="rect">
+            <a:avLst/>
+          </a:prstGeom>
+          <a:solidFill>
+            <a:srgbClr val="7ACFF5"/>
+          </a:solidFill>
+          <a:ln w="3175"/>
+        </p:spPr>
+        <p:style>
+          <a:lnRef idx="2">
+            <a:schemeClr val="accent1">
+              <a:shade val="50000"/>
+            </a:schemeClr>
+          </a:lnRef>
+          <a:fillRef idx="1">
+            <a:schemeClr val="accent1"/>
+          </a:fillRef>
+          <a:effectRef idx="0">
+            <a:schemeClr val="accent1"/>
+          </a:effectRef>
+          <a:fontRef idx="minor">
+            <a:schemeClr val="lt1"/>
+          </a:fontRef>
+        </p:style>
+        <p:txBody>
+          <a:bodyPr rtlCol="0" anchor="ctr"/>
+          <a:lstStyle/>
+          <a:p>
+            <a:pPr algn="ctr"/>
+            <a:endParaRPr lang="de-DE">
+              <a:solidFill>
+                <a:schemeClr val="accent1">
+                  <a:lumMod val="20000"/>
+                  <a:lumOff val="80000"/>
+                </a:schemeClr>
+              </a:solidFill>
+            </a:endParaRPr>
+          </a:p>
+        </p:txBody>
+      </p:sp>
+      <p:cxnSp>
+        <p:nvCxnSpPr>
+          <p:cNvPr id="11" name="Straight Connector 10">
+            <a:extLst>
+              <a:ext uri="{FF2B5EF4-FFF2-40B4-BE49-F238E27FC236}">
+                <a16:creationId xmlns:a16="http://schemas.microsoft.com/office/drawing/2014/main" id="{A079992E-AD7B-4D7A-9063-A83D1A70AF4F}"/>
+              </a:ext>
+            </a:extLst>
+          </p:cNvPr>
+          <p:cNvCxnSpPr/>
+          <p:nvPr/>
+        </p:nvCxnSpPr>
+        <p:spPr>
+          <a:xfrm>
+            <a:off x="6466114" y="4058816"/>
+            <a:ext cx="2132580" cy="0"/>
+          </a:xfrm>
+          <a:prstGeom prst="line">
+            <a:avLst/>
+          </a:prstGeom>
+        </p:spPr>
+        <p:style>
+          <a:lnRef idx="2">
+            <a:schemeClr val="accent1"/>
+          </a:lnRef>
+          <a:fillRef idx="0">
+            <a:schemeClr val="accent1"/>
+          </a:fillRef>
+          <a:effectRef idx="1">
+            <a:schemeClr val="accent1"/>
+          </a:effectRef>
+          <a:fontRef idx="minor">
+            <a:schemeClr val="tx1"/>
+          </a:fontRef>
+        </p:style>
+      </p:cxnSp>
+      <p:sp>
+        <p:nvSpPr>
+          <p:cNvPr id="12" name="TextBox 11">
+            <a:extLst>
+              <a:ext uri="{FF2B5EF4-FFF2-40B4-BE49-F238E27FC236}">
+                <a16:creationId xmlns:a16="http://schemas.microsoft.com/office/drawing/2014/main" id="{0436EA82-2B60-482E-8A40-576EDF2941BF}"/>
+              </a:ext>
+            </a:extLst>
+          </p:cNvPr>
+          <p:cNvSpPr txBox="1"/>
+          <p:nvPr/>
+        </p:nvSpPr>
+        <p:spPr>
+          <a:xfrm>
+            <a:off x="6996167" y="3812232"/>
+            <a:ext cx="1072473" cy="276999"/>
+          </a:xfrm>
+          <a:prstGeom prst="rect">
+            <a:avLst/>
+          </a:prstGeom>
+          <a:noFill/>
+        </p:spPr>
+        <p:txBody>
+          <a:bodyPr wrap="none" rtlCol="0">
+            <a:spAutoFit/>
+          </a:bodyPr>
+          <a:lstStyle/>
+          <a:p>
+            <a:r>
+              <a:rPr lang="de-DE" sz="1200" b="1" dirty="0"/>
+              <a:t>Conveyer belt</a:t>
+            </a:r>
+          </a:p>
+        </p:txBody>
+      </p:sp>
+      <p:cxnSp>
+        <p:nvCxnSpPr>
+          <p:cNvPr id="13" name="Straight Connector 12">
+            <a:extLst>
+              <a:ext uri="{FF2B5EF4-FFF2-40B4-BE49-F238E27FC236}">
+                <a16:creationId xmlns:a16="http://schemas.microsoft.com/office/drawing/2014/main" id="{5348E89B-F342-4CC9-A9CD-CE549DDE70FB}"/>
+              </a:ext>
+            </a:extLst>
+          </p:cNvPr>
+          <p:cNvCxnSpPr/>
+          <p:nvPr/>
+        </p:nvCxnSpPr>
+        <p:spPr>
+          <a:xfrm>
+            <a:off x="6457554" y="4603102"/>
+            <a:ext cx="2132580" cy="0"/>
+          </a:xfrm>
+          <a:prstGeom prst="line">
+            <a:avLst/>
+          </a:prstGeom>
+        </p:spPr>
+        <p:style>
+          <a:lnRef idx="2">
+            <a:schemeClr val="accent1"/>
+          </a:lnRef>
+          <a:fillRef idx="0">
+            <a:schemeClr val="accent1"/>
+          </a:fillRef>
+          <a:effectRef idx="1">
+            <a:schemeClr val="accent1"/>
+          </a:effectRef>
+          <a:fontRef idx="minor">
+            <a:schemeClr val="tx1"/>
+          </a:fontRef>
+        </p:style>
+      </p:cxnSp>
+      <p:sp>
+        <p:nvSpPr>
+          <p:cNvPr id="14" name="TextBox 13">
+            <a:extLst>
+              <a:ext uri="{FF2B5EF4-FFF2-40B4-BE49-F238E27FC236}">
+                <a16:creationId xmlns:a16="http://schemas.microsoft.com/office/drawing/2014/main" id="{7A891288-FD06-4E75-8BAD-D156F0E4DE01}"/>
+              </a:ext>
+            </a:extLst>
+          </p:cNvPr>
+          <p:cNvSpPr txBox="1"/>
+          <p:nvPr/>
+        </p:nvSpPr>
+        <p:spPr>
+          <a:xfrm>
+            <a:off x="6439877" y="4042206"/>
+            <a:ext cx="1072473" cy="400110"/>
+          </a:xfrm>
+          <a:prstGeom prst="rect">
+            <a:avLst/>
+          </a:prstGeom>
+          <a:noFill/>
+        </p:spPr>
+        <p:txBody>
+          <a:bodyPr wrap="square" rtlCol="0">
+            <a:spAutoFit/>
+          </a:bodyPr>
+          <a:lstStyle/>
+          <a:p>
+            <a:r>
+              <a:rPr lang="de-DE" sz="1000" dirty="0"/>
+              <a:t>-</a:t>
+            </a:r>
+            <a:r>
+              <a:rPr lang="de-DE" sz="1000" dirty="0" err="1"/>
+              <a:t>dirPin</a:t>
+            </a:r>
+            <a:r>
+              <a:rPr lang="de-DE" sz="1000" dirty="0"/>
+              <a:t> : </a:t>
+            </a:r>
+            <a:r>
+              <a:rPr lang="de-DE" sz="1000" dirty="0" err="1"/>
+              <a:t>int</a:t>
+            </a:r>
+            <a:br>
+              <a:rPr lang="de-DE" sz="1000" dirty="0"/>
+            </a:br>
+            <a:r>
+              <a:rPr lang="de-DE" sz="1000" dirty="0"/>
+              <a:t>-</a:t>
+            </a:r>
+            <a:r>
+              <a:rPr lang="de-DE" sz="1000" dirty="0" err="1"/>
+              <a:t>stepPin</a:t>
+            </a:r>
+            <a:r>
+              <a:rPr lang="de-DE" sz="1000" dirty="0"/>
+              <a:t> : </a:t>
+            </a:r>
+            <a:r>
+              <a:rPr lang="de-DE" sz="1000" dirty="0" err="1"/>
+              <a:t>int</a:t>
+            </a:r>
+            <a:endParaRPr lang="de-DE" sz="1000" dirty="0"/>
+          </a:p>
+        </p:txBody>
+      </p:sp>
+      <p:sp>
+        <p:nvSpPr>
+          <p:cNvPr id="15" name="TextBox 14">
+            <a:extLst>
+              <a:ext uri="{FF2B5EF4-FFF2-40B4-BE49-F238E27FC236}">
+                <a16:creationId xmlns:a16="http://schemas.microsoft.com/office/drawing/2014/main" id="{A707AFB4-CF7C-40A1-8897-8F72316B4FB7}"/>
+              </a:ext>
+            </a:extLst>
+          </p:cNvPr>
+          <p:cNvSpPr txBox="1"/>
+          <p:nvPr/>
+        </p:nvSpPr>
+        <p:spPr>
+          <a:xfrm>
+            <a:off x="6451371" y="4642572"/>
+            <a:ext cx="1072473" cy="400110"/>
+          </a:xfrm>
+          <a:prstGeom prst="rect">
+            <a:avLst/>
+          </a:prstGeom>
+          <a:noFill/>
+        </p:spPr>
+        <p:txBody>
+          <a:bodyPr wrap="square" rtlCol="0">
+            <a:spAutoFit/>
+          </a:bodyPr>
+          <a:lstStyle/>
+          <a:p>
+            <a:r>
+              <a:rPr lang="de-DE" sz="1000" dirty="0"/>
+              <a:t>+</a:t>
+            </a:r>
+            <a:r>
+              <a:rPr lang="de-DE" sz="1000" dirty="0" err="1"/>
+              <a:t>move</a:t>
+            </a:r>
+            <a:r>
+              <a:rPr lang="de-DE" sz="1000" dirty="0"/>
+              <a:t> : </a:t>
+            </a:r>
+            <a:r>
+              <a:rPr lang="de-DE" sz="1000" dirty="0" err="1"/>
+              <a:t>void</a:t>
+            </a:r>
+            <a:br>
+              <a:rPr lang="de-DE" sz="1000" dirty="0"/>
+            </a:br>
+            <a:r>
+              <a:rPr lang="de-DE" sz="1000" dirty="0"/>
+              <a:t>+</a:t>
+            </a:r>
+            <a:r>
+              <a:rPr lang="de-DE" sz="1000" dirty="0" err="1"/>
+              <a:t>stop</a:t>
+            </a:r>
+            <a:r>
+              <a:rPr lang="de-DE" sz="1000" dirty="0"/>
+              <a:t> : </a:t>
+            </a:r>
+            <a:r>
+              <a:rPr lang="de-DE" sz="1000" dirty="0" err="1"/>
+              <a:t>void</a:t>
+            </a:r>
+            <a:endParaRPr lang="de-DE" sz="1000" dirty="0"/>
+          </a:p>
+        </p:txBody>
+      </p:sp>
     </p:spTree>
     <p:extLst>
       <p:ext uri="{BB962C8B-B14F-4D97-AF65-F5344CB8AC3E}">

</xml_diff>